<commit_message>
402 poster with connected graph.
</commit_message>
<xml_diff>
--- a/documents/posters/Anguiano_402_Presentation_Draft_Poster.pptx
+++ b/documents/posters/Anguiano_402_Presentation_Draft_Poster.pptx
@@ -288,7 +288,7 @@
           <a:p>
             <a:fld id="{8B07C2FA-1E7E-9746-B436-AF4CC8976EEE}" type="datetimeFigureOut">
               <a:rPr lang="en-US" smtClean="0"/>
-              <a:t>4/28/17</a:t>
+              <a:t>5/5/17</a:t>
             </a:fld>
             <a:endParaRPr lang="en-US"/>
           </a:p>
@@ -458,7 +458,7 @@
           <a:p>
             <a:fld id="{8B07C2FA-1E7E-9746-B436-AF4CC8976EEE}" type="datetimeFigureOut">
               <a:rPr lang="en-US" smtClean="0"/>
-              <a:t>4/28/17</a:t>
+              <a:t>5/5/17</a:t>
             </a:fld>
             <a:endParaRPr lang="en-US"/>
           </a:p>
@@ -638,7 +638,7 @@
           <a:p>
             <a:fld id="{8B07C2FA-1E7E-9746-B436-AF4CC8976EEE}" type="datetimeFigureOut">
               <a:rPr lang="en-US" smtClean="0"/>
-              <a:t>4/28/17</a:t>
+              <a:t>5/5/17</a:t>
             </a:fld>
             <a:endParaRPr lang="en-US"/>
           </a:p>
@@ -808,7 +808,7 @@
           <a:p>
             <a:fld id="{8B07C2FA-1E7E-9746-B436-AF4CC8976EEE}" type="datetimeFigureOut">
               <a:rPr lang="en-US" smtClean="0"/>
-              <a:t>4/28/17</a:t>
+              <a:t>5/5/17</a:t>
             </a:fld>
             <a:endParaRPr lang="en-US"/>
           </a:p>
@@ -1054,7 +1054,7 @@
           <a:p>
             <a:fld id="{8B07C2FA-1E7E-9746-B436-AF4CC8976EEE}" type="datetimeFigureOut">
               <a:rPr lang="en-US" smtClean="0"/>
-              <a:t>4/28/17</a:t>
+              <a:t>5/5/17</a:t>
             </a:fld>
             <a:endParaRPr lang="en-US"/>
           </a:p>
@@ -1342,7 +1342,7 @@
           <a:p>
             <a:fld id="{8B07C2FA-1E7E-9746-B436-AF4CC8976EEE}" type="datetimeFigureOut">
               <a:rPr lang="en-US" smtClean="0"/>
-              <a:t>4/28/17</a:t>
+              <a:t>5/5/17</a:t>
             </a:fld>
             <a:endParaRPr lang="en-US"/>
           </a:p>
@@ -1764,7 +1764,7 @@
           <a:p>
             <a:fld id="{8B07C2FA-1E7E-9746-B436-AF4CC8976EEE}" type="datetimeFigureOut">
               <a:rPr lang="en-US" smtClean="0"/>
-              <a:t>4/28/17</a:t>
+              <a:t>5/5/17</a:t>
             </a:fld>
             <a:endParaRPr lang="en-US"/>
           </a:p>
@@ -1882,7 +1882,7 @@
           <a:p>
             <a:fld id="{8B07C2FA-1E7E-9746-B436-AF4CC8976EEE}" type="datetimeFigureOut">
               <a:rPr lang="en-US" smtClean="0"/>
-              <a:t>4/28/17</a:t>
+              <a:t>5/5/17</a:t>
             </a:fld>
             <a:endParaRPr lang="en-US"/>
           </a:p>
@@ -1977,7 +1977,7 @@
           <a:p>
             <a:fld id="{8B07C2FA-1E7E-9746-B436-AF4CC8976EEE}" type="datetimeFigureOut">
               <a:rPr lang="en-US" smtClean="0"/>
-              <a:t>4/28/17</a:t>
+              <a:t>5/5/17</a:t>
             </a:fld>
             <a:endParaRPr lang="en-US"/>
           </a:p>
@@ -2254,7 +2254,7 @@
           <a:p>
             <a:fld id="{8B07C2FA-1E7E-9746-B436-AF4CC8976EEE}" type="datetimeFigureOut">
               <a:rPr lang="en-US" smtClean="0"/>
-              <a:t>4/28/17</a:t>
+              <a:t>5/5/17</a:t>
             </a:fld>
             <a:endParaRPr lang="en-US"/>
           </a:p>
@@ -2507,7 +2507,7 @@
           <a:p>
             <a:fld id="{8B07C2FA-1E7E-9746-B436-AF4CC8976EEE}" type="datetimeFigureOut">
               <a:rPr lang="en-US" smtClean="0"/>
-              <a:t>4/28/17</a:t>
+              <a:t>5/5/17</a:t>
             </a:fld>
             <a:endParaRPr lang="en-US"/>
           </a:p>
@@ -2720,7 +2720,7 @@
           <a:p>
             <a:fld id="{8B07C2FA-1E7E-9746-B436-AF4CC8976EEE}" type="datetimeFigureOut">
               <a:rPr lang="en-US" smtClean="0"/>
-              <a:t>4/28/17</a:t>
+              <a:t>5/5/17</a:t>
             </a:fld>
             <a:endParaRPr lang="en-US"/>
           </a:p>
@@ -3095,107 +3095,9 @@
           <a:chExt cx="0" cy="0"/>
         </a:xfrm>
       </p:grpSpPr>
-      <p:sp>
-        <p:nvSpPr>
-          <p:cNvPr id="4" name="TextBox 3"/>
-          <p:cNvSpPr txBox="1"/>
-          <p:nvPr/>
-        </p:nvSpPr>
-        <p:spPr>
-          <a:xfrm>
-            <a:off x="1678237" y="592937"/>
-            <a:ext cx="40942945" cy="6924973"/>
-          </a:xfrm>
-          <a:prstGeom prst="rect">
-            <a:avLst/>
-          </a:prstGeom>
-          <a:noFill/>
-        </p:spPr>
-        <p:txBody>
-          <a:bodyPr wrap="square" rtlCol="0">
-            <a:spAutoFit/>
-          </a:bodyPr>
-          <a:lstStyle/>
-          <a:p>
-            <a:pPr algn="ctr"/>
-            <a:r>
-              <a:rPr lang="en-US" sz="16600" dirty="0" err="1" smtClean="0">
-                <a:cs typeface="Helvetica Neue"/>
-              </a:rPr>
-              <a:t>GRNsight</a:t>
-            </a:r>
-            <a:endParaRPr lang="en-US" sz="8000" dirty="0" smtClean="0">
-              <a:cs typeface="Helvetica Neue"/>
-            </a:endParaRPr>
-          </a:p>
-          <a:p>
-            <a:pPr algn="ctr"/>
-            <a:r>
-              <a:rPr lang="en-US" sz="6600" dirty="0" smtClean="0">
-                <a:cs typeface="Helvetica Neue"/>
-              </a:rPr>
-              <a:t>Nicole Anguiano</a:t>
-            </a:r>
-          </a:p>
-          <a:p>
-            <a:pPr algn="ctr"/>
-            <a:r>
-              <a:rPr lang="en-US" sz="6600" dirty="0" smtClean="0">
-                <a:cs typeface="Helvetica Neue"/>
-              </a:rPr>
-              <a:t>CMSI 402</a:t>
-            </a:r>
-          </a:p>
-          <a:p>
-            <a:pPr algn="ctr"/>
-            <a:r>
-              <a:rPr lang="en-US" sz="6600" dirty="0" smtClean="0">
-                <a:cs typeface="Helvetica Neue"/>
-              </a:rPr>
-              <a:t>5/5/17</a:t>
-            </a:r>
-          </a:p>
-          <a:p>
-            <a:pPr algn="ctr"/>
-            <a:r>
-              <a:rPr lang="en-US" sz="8000" dirty="0" smtClean="0">
-                <a:cs typeface="Helvetica Neue"/>
-              </a:rPr>
-              <a:t>http://</a:t>
-            </a:r>
-            <a:r>
-              <a:rPr lang="en-US" sz="8000" dirty="0" err="1" smtClean="0">
-                <a:cs typeface="Helvetica Neue"/>
-              </a:rPr>
-              <a:t>dondi.github.io</a:t>
-            </a:r>
-            <a:r>
-              <a:rPr lang="en-US" sz="8000" dirty="0" smtClean="0">
-                <a:cs typeface="Helvetica Neue"/>
-              </a:rPr>
-              <a:t>/</a:t>
-            </a:r>
-            <a:r>
-              <a:rPr lang="en-US" sz="8000" dirty="0" err="1" smtClean="0">
-                <a:cs typeface="Helvetica Neue"/>
-              </a:rPr>
-              <a:t>GRNsight</a:t>
-            </a:r>
-            <a:r>
-              <a:rPr lang="en-US" sz="8000" dirty="0" smtClean="0">
-                <a:cs typeface="Helvetica Neue"/>
-              </a:rPr>
-              <a:t>/</a:t>
-            </a:r>
-            <a:endParaRPr lang="en-US" sz="8000" dirty="0">
-              <a:cs typeface="Helvetica Neue"/>
-            </a:endParaRPr>
-          </a:p>
-        </p:txBody>
-      </p:sp>
       <p:pic>
         <p:nvPicPr>
-          <p:cNvPr id="6" name="Picture 5" descr="LMU_LA_logo.png"/>
+          <p:cNvPr id="5" name="Picture 4" descr="Screen Shot 2017-05-05 at 7.55.04 AM.png"/>
           <p:cNvPicPr>
             <a:picLocks noChangeAspect="1"/>
           </p:cNvPicPr>
@@ -3215,17 +3117,115 @@
         </p:blipFill>
         <p:spPr>
           <a:xfrm>
-            <a:off x="33116011" y="1693162"/>
-            <a:ext cx="8536977" cy="4593641"/>
+            <a:off x="13106400" y="10963367"/>
+            <a:ext cx="18288000" cy="10905541"/>
           </a:xfrm>
           <a:prstGeom prst="rect">
             <a:avLst/>
           </a:prstGeom>
         </p:spPr>
       </p:pic>
+      <p:sp>
+        <p:nvSpPr>
+          <p:cNvPr id="4" name="TextBox 3"/>
+          <p:cNvSpPr txBox="1"/>
+          <p:nvPr/>
+        </p:nvSpPr>
+        <p:spPr>
+          <a:xfrm>
+            <a:off x="1678237" y="592937"/>
+            <a:ext cx="40942945" cy="6924973"/>
+          </a:xfrm>
+          <a:prstGeom prst="rect">
+            <a:avLst/>
+          </a:prstGeom>
+          <a:noFill/>
+        </p:spPr>
+        <p:txBody>
+          <a:bodyPr wrap="square" rtlCol="0">
+            <a:spAutoFit/>
+          </a:bodyPr>
+          <a:lstStyle/>
+          <a:p>
+            <a:pPr algn="ctr"/>
+            <a:r>
+              <a:rPr lang="en-US" sz="16600" dirty="0" err="1" smtClean="0">
+                <a:cs typeface="Helvetica Neue"/>
+              </a:rPr>
+              <a:t>GRNsight</a:t>
+            </a:r>
+            <a:endParaRPr lang="en-US" sz="8000" dirty="0" smtClean="0">
+              <a:cs typeface="Helvetica Neue"/>
+            </a:endParaRPr>
+          </a:p>
+          <a:p>
+            <a:pPr algn="ctr"/>
+            <a:r>
+              <a:rPr lang="en-US" sz="6600" dirty="0" smtClean="0">
+                <a:cs typeface="Helvetica Neue"/>
+              </a:rPr>
+              <a:t>Nicole Anguiano</a:t>
+            </a:r>
+          </a:p>
+          <a:p>
+            <a:pPr algn="ctr"/>
+            <a:r>
+              <a:rPr lang="en-US" sz="6600" dirty="0" smtClean="0">
+                <a:cs typeface="Helvetica Neue"/>
+              </a:rPr>
+              <a:t>CMSI 402</a:t>
+            </a:r>
+          </a:p>
+          <a:p>
+            <a:pPr algn="ctr"/>
+            <a:r>
+              <a:rPr lang="en-US" sz="6600" dirty="0" smtClean="0">
+                <a:cs typeface="Helvetica Neue"/>
+              </a:rPr>
+              <a:t>5/5/17</a:t>
+            </a:r>
+          </a:p>
+          <a:p>
+            <a:pPr algn="ctr"/>
+            <a:r>
+              <a:rPr lang="en-US" sz="8000" dirty="0" smtClean="0">
+                <a:cs typeface="Helvetica Neue"/>
+              </a:rPr>
+              <a:t>http://</a:t>
+            </a:r>
+            <a:r>
+              <a:rPr lang="en-US" sz="8000" dirty="0" err="1" smtClean="0">
+                <a:cs typeface="Helvetica Neue"/>
+              </a:rPr>
+              <a:t>dondi.github.io</a:t>
+            </a:r>
+            <a:r>
+              <a:rPr lang="en-US" sz="8000" dirty="0" smtClean="0">
+                <a:cs typeface="Helvetica Neue"/>
+              </a:rPr>
+              <a:t>/</a:t>
+            </a:r>
+            <a:r>
+              <a:rPr lang="en-US" sz="8000" dirty="0" err="1" smtClean="0">
+                <a:cs typeface="Helvetica Neue"/>
+              </a:rPr>
+              <a:t>GRNsight</a:t>
+            </a:r>
+            <a:r>
+              <a:rPr lang="en-US" sz="8000" dirty="0" smtClean="0">
+                <a:cs typeface="Helvetica Neue"/>
+              </a:rPr>
+              <a:t>/</a:t>
+            </a:r>
+            <a:endParaRPr lang="en-US" sz="8000" dirty="0">
+              <a:cs typeface="Helvetica Neue"/>
+            </a:endParaRPr>
+          </a:p>
+        </p:txBody>
+      </p:sp>
       <p:pic>
         <p:nvPicPr>
-          <p:cNvPr id="7" name="Picture 6" descr="GRNsight_logo_20140710_main.jpg"/>
+          <p:cNvPr id="6" name="Picture 5" descr="LMU_LA_logo.png"/>
           <p:cNvPicPr>
             <a:picLocks noChangeAspect="1"/>
           </p:cNvPicPr>
@@ -3245,426 +3245,17 @@
         </p:blipFill>
         <p:spPr>
           <a:xfrm>
-            <a:off x="1678237" y="1693162"/>
-            <a:ext cx="10058400" cy="4318000"/>
+            <a:off x="33116011" y="1693162"/>
+            <a:ext cx="8536977" cy="4593641"/>
           </a:xfrm>
           <a:prstGeom prst="rect">
             <a:avLst/>
           </a:prstGeom>
         </p:spPr>
       </p:pic>
-      <p:sp>
-        <p:nvSpPr>
-          <p:cNvPr id="10" name="TextBox 9"/>
-          <p:cNvSpPr txBox="1"/>
-          <p:nvPr/>
-        </p:nvSpPr>
-        <p:spPr>
-          <a:xfrm>
-            <a:off x="1981200" y="7387028"/>
-            <a:ext cx="7162800" cy="1946444"/>
-          </a:xfrm>
-          <a:prstGeom prst="rect">
-            <a:avLst/>
-          </a:prstGeom>
-          <a:noFill/>
-          <a:ln>
-            <a:solidFill>
-              <a:srgbClr val="000000"/>
-            </a:solidFill>
-          </a:ln>
-        </p:spPr>
-        <p:txBody>
-          <a:bodyPr wrap="square" rtlCol="0" anchor="ctr">
-            <a:noAutofit/>
-          </a:bodyPr>
-          <a:lstStyle/>
-          <a:p>
-            <a:pPr algn="ctr">
-              <a:lnSpc>
-                <a:spcPct val="70000"/>
-              </a:lnSpc>
-            </a:pPr>
-            <a:r>
-              <a:rPr lang="en-US" sz="8800" b="1" dirty="0" smtClean="0"/>
-              <a:t>About</a:t>
-            </a:r>
-            <a:endParaRPr lang="en-US" sz="8000" b="1" dirty="0"/>
-          </a:p>
-        </p:txBody>
-      </p:sp>
-      <p:cxnSp>
-        <p:nvCxnSpPr>
-          <p:cNvPr id="17" name="Straight Arrow Connector 16"/>
-          <p:cNvCxnSpPr>
-            <a:stCxn id="10" idx="2"/>
-            <a:endCxn id="35" idx="0"/>
-          </p:cNvCxnSpPr>
-          <p:nvPr/>
-        </p:nvCxnSpPr>
-        <p:spPr>
-          <a:xfrm flipH="1">
-            <a:off x="5557004" y="9333472"/>
-            <a:ext cx="5596" cy="1377556"/>
-          </a:xfrm>
-          <a:prstGeom prst="straightConnector1">
-            <a:avLst/>
-          </a:prstGeom>
-          <a:ln w="190500" cmpd="sng">
-            <a:solidFill>
-              <a:srgbClr val="C71585"/>
-            </a:solidFill>
-            <a:tailEnd type="triangle"/>
-          </a:ln>
-        </p:spPr>
-        <p:style>
-          <a:lnRef idx="2">
-            <a:schemeClr val="accent1"/>
-          </a:lnRef>
-          <a:fillRef idx="0">
-            <a:schemeClr val="accent1"/>
-          </a:fillRef>
-          <a:effectRef idx="1">
-            <a:schemeClr val="accent1"/>
-          </a:effectRef>
-          <a:fontRef idx="minor">
-            <a:schemeClr val="tx1"/>
-          </a:fontRef>
-        </p:style>
-      </p:cxnSp>
-      <p:sp>
-        <p:nvSpPr>
-          <p:cNvPr id="35" name="TextBox 34"/>
-          <p:cNvSpPr txBox="1"/>
-          <p:nvPr/>
-        </p:nvSpPr>
-        <p:spPr>
-          <a:xfrm>
-            <a:off x="547608" y="10711028"/>
-            <a:ext cx="10018792" cy="3028596"/>
-          </a:xfrm>
-          <a:prstGeom prst="rect">
-            <a:avLst/>
-          </a:prstGeom>
-          <a:noFill/>
-          <a:ln>
-            <a:solidFill>
-              <a:srgbClr val="000000"/>
-            </a:solidFill>
-          </a:ln>
-        </p:spPr>
-        <p:txBody>
-          <a:bodyPr wrap="square" rtlCol="0" anchor="ctr">
-            <a:noAutofit/>
-          </a:bodyPr>
-          <a:lstStyle/>
-          <a:p>
-            <a:pPr algn="ctr">
-              <a:lnSpc>
-                <a:spcPct val="70000"/>
-              </a:lnSpc>
-            </a:pPr>
-            <a:r>
-              <a:rPr lang="en-US" sz="5400" dirty="0" err="1" smtClean="0"/>
-              <a:t>GRNsight</a:t>
-            </a:r>
-            <a:r>
-              <a:rPr lang="en-US" sz="5400" dirty="0" smtClean="0"/>
-              <a:t> is a web application and service for visualizing models of small- to medium-scale gene regulatory networks (GRNs). </a:t>
-            </a:r>
-            <a:endParaRPr lang="en-US" sz="6600" dirty="0"/>
-          </a:p>
-        </p:txBody>
-      </p:sp>
-      <p:sp>
-        <p:nvSpPr>
-          <p:cNvPr id="49" name="TextBox 48"/>
-          <p:cNvSpPr txBox="1"/>
-          <p:nvPr/>
-        </p:nvSpPr>
-        <p:spPr>
-          <a:xfrm>
-            <a:off x="547608" y="15109780"/>
-            <a:ext cx="10018792" cy="2687964"/>
-          </a:xfrm>
-          <a:prstGeom prst="rect">
-            <a:avLst/>
-          </a:prstGeom>
-          <a:noFill/>
-          <a:ln>
-            <a:solidFill>
-              <a:srgbClr val="000000"/>
-            </a:solidFill>
-          </a:ln>
-        </p:spPr>
-        <p:txBody>
-          <a:bodyPr wrap="square" rtlCol="0" anchor="ctr">
-            <a:noAutofit/>
-          </a:bodyPr>
-          <a:lstStyle/>
-          <a:p>
-            <a:pPr algn="ctr">
-              <a:lnSpc>
-                <a:spcPct val="70000"/>
-              </a:lnSpc>
-            </a:pPr>
-            <a:r>
-              <a:rPr lang="en-US" sz="5400" dirty="0" smtClean="0"/>
-              <a:t>It accepts a representation of a GRN in XLSX, SIF, or </a:t>
-            </a:r>
-            <a:r>
-              <a:rPr lang="en-US" sz="5400" dirty="0" err="1" smtClean="0"/>
-              <a:t>GraphML</a:t>
-            </a:r>
-            <a:r>
-              <a:rPr lang="en-US" sz="5400" dirty="0" smtClean="0"/>
-              <a:t> format and outputs them as a directed graph.</a:t>
-            </a:r>
-            <a:endParaRPr lang="en-US" sz="6600" dirty="0"/>
-          </a:p>
-        </p:txBody>
-      </p:sp>
-      <p:cxnSp>
-        <p:nvCxnSpPr>
-          <p:cNvPr id="63" name="Straight Arrow Connector 62"/>
-          <p:cNvCxnSpPr>
-            <a:stCxn id="35" idx="2"/>
-            <a:endCxn id="49" idx="0"/>
-          </p:cNvCxnSpPr>
-          <p:nvPr/>
-        </p:nvCxnSpPr>
-        <p:spPr>
-          <a:xfrm>
-            <a:off x="5557004" y="13739624"/>
-            <a:ext cx="0" cy="1370156"/>
-          </a:xfrm>
-          <a:prstGeom prst="straightConnector1">
-            <a:avLst/>
-          </a:prstGeom>
-          <a:ln w="190500">
-            <a:solidFill>
-              <a:srgbClr val="C71585"/>
-            </a:solidFill>
-            <a:tailEnd type="triangle"/>
-          </a:ln>
-        </p:spPr>
-        <p:style>
-          <a:lnRef idx="2">
-            <a:schemeClr val="accent1"/>
-          </a:lnRef>
-          <a:fillRef idx="0">
-            <a:schemeClr val="accent1"/>
-          </a:fillRef>
-          <a:effectRef idx="1">
-            <a:schemeClr val="accent1"/>
-          </a:effectRef>
-          <a:fontRef idx="minor">
-            <a:schemeClr val="tx1"/>
-          </a:fontRef>
-        </p:style>
-      </p:cxnSp>
-      <p:sp>
-        <p:nvSpPr>
-          <p:cNvPr id="103" name="TextBox 102"/>
-          <p:cNvSpPr txBox="1"/>
-          <p:nvPr/>
-        </p:nvSpPr>
-        <p:spPr>
-          <a:xfrm>
-            <a:off x="18707100" y="7819678"/>
-            <a:ext cx="7912099" cy="2410813"/>
-          </a:xfrm>
-          <a:prstGeom prst="rect">
-            <a:avLst/>
-          </a:prstGeom>
-          <a:noFill/>
-          <a:ln>
-            <a:solidFill>
-              <a:srgbClr val="000000"/>
-            </a:solidFill>
-          </a:ln>
-        </p:spPr>
-        <p:txBody>
-          <a:bodyPr wrap="square" rtlCol="0" anchor="ctr">
-            <a:noAutofit/>
-          </a:bodyPr>
-          <a:lstStyle/>
-          <a:p>
-            <a:pPr algn="ctr">
-              <a:lnSpc>
-                <a:spcPct val="70000"/>
-              </a:lnSpc>
-            </a:pPr>
-            <a:r>
-              <a:rPr lang="en-US" sz="8800" b="1" dirty="0" smtClean="0"/>
-              <a:t>Snapshot of User Interface</a:t>
-            </a:r>
-            <a:endParaRPr lang="en-US" sz="8800" b="1" dirty="0"/>
-          </a:p>
-        </p:txBody>
-      </p:sp>
-      <p:sp>
-        <p:nvSpPr>
-          <p:cNvPr id="109" name="TextBox 108"/>
-          <p:cNvSpPr txBox="1"/>
-          <p:nvPr/>
-        </p:nvSpPr>
-        <p:spPr>
-          <a:xfrm>
-            <a:off x="553204" y="19186572"/>
-            <a:ext cx="10018792" cy="2518436"/>
-          </a:xfrm>
-          <a:prstGeom prst="rect">
-            <a:avLst/>
-          </a:prstGeom>
-          <a:noFill/>
-          <a:ln>
-            <a:solidFill>
-              <a:srgbClr val="000000"/>
-            </a:solidFill>
-          </a:ln>
-        </p:spPr>
-        <p:txBody>
-          <a:bodyPr wrap="square" rtlCol="0" anchor="ctr">
-            <a:noAutofit/>
-          </a:bodyPr>
-          <a:lstStyle/>
-          <a:p>
-            <a:pPr algn="ctr">
-              <a:lnSpc>
-                <a:spcPct val="70000"/>
-              </a:lnSpc>
-            </a:pPr>
-            <a:r>
-              <a:rPr lang="en-US" sz="5400" dirty="0" smtClean="0"/>
-              <a:t>Transcription factors are displayed as nodes, with edges representing the relationships between them.</a:t>
-            </a:r>
-            <a:endParaRPr lang="en-US" sz="5400" dirty="0"/>
-          </a:p>
-        </p:txBody>
-      </p:sp>
-      <p:cxnSp>
-        <p:nvCxnSpPr>
-          <p:cNvPr id="114" name="Straight Arrow Connector 113"/>
-          <p:cNvCxnSpPr>
-            <a:stCxn id="49" idx="2"/>
-            <a:endCxn id="109" idx="0"/>
-          </p:cNvCxnSpPr>
-          <p:nvPr/>
-        </p:nvCxnSpPr>
-        <p:spPr>
-          <a:xfrm>
-            <a:off x="5557004" y="17797744"/>
-            <a:ext cx="5596" cy="1388828"/>
-          </a:xfrm>
-          <a:prstGeom prst="straightConnector1">
-            <a:avLst/>
-          </a:prstGeom>
-          <a:ln w="190500" cmpd="sng">
-            <a:solidFill>
-              <a:srgbClr val="C71585"/>
-            </a:solidFill>
-            <a:tailEnd type="triangle"/>
-          </a:ln>
-        </p:spPr>
-        <p:style>
-          <a:lnRef idx="2">
-            <a:schemeClr val="accent1"/>
-          </a:lnRef>
-          <a:fillRef idx="0">
-            <a:schemeClr val="accent1"/>
-          </a:fillRef>
-          <a:effectRef idx="1">
-            <a:schemeClr val="accent1"/>
-          </a:effectRef>
-          <a:fontRef idx="minor">
-            <a:schemeClr val="tx1"/>
-          </a:fontRef>
-        </p:style>
-      </p:cxnSp>
-      <p:sp>
-        <p:nvSpPr>
-          <p:cNvPr id="125" name="TextBox 124"/>
-          <p:cNvSpPr txBox="1"/>
-          <p:nvPr/>
-        </p:nvSpPr>
-        <p:spPr>
-          <a:xfrm>
-            <a:off x="954008" y="30740076"/>
-            <a:ext cx="7162800" cy="1946444"/>
-          </a:xfrm>
-          <a:prstGeom prst="rect">
-            <a:avLst/>
-          </a:prstGeom>
-          <a:noFill/>
-          <a:ln>
-            <a:solidFill>
-              <a:srgbClr val="000000"/>
-            </a:solidFill>
-          </a:ln>
-        </p:spPr>
-        <p:txBody>
-          <a:bodyPr wrap="square" rtlCol="0" anchor="ctr">
-            <a:noAutofit/>
-          </a:bodyPr>
-          <a:lstStyle/>
-          <a:p>
-            <a:pPr algn="ctr">
-              <a:lnSpc>
-                <a:spcPct val="70000"/>
-              </a:lnSpc>
-            </a:pPr>
-            <a:r>
-              <a:rPr lang="en-US" sz="9600" b="1" dirty="0" smtClean="0"/>
-              <a:t>Technologies</a:t>
-            </a:r>
-            <a:endParaRPr lang="en-US" sz="8000" b="1" dirty="0"/>
-          </a:p>
-        </p:txBody>
-      </p:sp>
-      <p:sp>
-        <p:nvSpPr>
-          <p:cNvPr id="127" name="TextBox 126"/>
-          <p:cNvSpPr txBox="1"/>
-          <p:nvPr/>
-        </p:nvSpPr>
-        <p:spPr>
-          <a:xfrm>
-            <a:off x="34751300" y="19900962"/>
-            <a:ext cx="7162800" cy="1946444"/>
-          </a:xfrm>
-          <a:prstGeom prst="rect">
-            <a:avLst/>
-          </a:prstGeom>
-          <a:noFill/>
-          <a:ln>
-            <a:solidFill>
-              <a:srgbClr val="000000"/>
-            </a:solidFill>
-          </a:ln>
-        </p:spPr>
-        <p:txBody>
-          <a:bodyPr wrap="square" rtlCol="0" anchor="ctr">
-            <a:noAutofit/>
-          </a:bodyPr>
-          <a:lstStyle/>
-          <a:p>
-            <a:pPr algn="ctr">
-              <a:lnSpc>
-                <a:spcPct val="70000"/>
-              </a:lnSpc>
-            </a:pPr>
-            <a:r>
-              <a:rPr lang="en-US" sz="6600" b="1" dirty="0" smtClean="0"/>
-              <a:t>Acknowledgements</a:t>
-            </a:r>
-            <a:endParaRPr lang="en-US" sz="6600" b="1" dirty="0"/>
-          </a:p>
-        </p:txBody>
-      </p:sp>
       <p:pic>
         <p:nvPicPr>
-          <p:cNvPr id="133" name="Picture 132" descr="Screen Shot 2017-04-28 at 4.03.23 PM.png"/>
+          <p:cNvPr id="7" name="Picture 6" descr="GRNsight_logo_20140710_main.jpg"/>
           <p:cNvPicPr>
             <a:picLocks noChangeAspect="1"/>
           </p:cNvPicPr>
@@ -3684,8 +3275,8 @@
         </p:blipFill>
         <p:spPr>
           <a:xfrm>
-            <a:off x="13106400" y="11036242"/>
-            <a:ext cx="18288000" cy="11014364"/>
+            <a:off x="1678237" y="1693162"/>
+            <a:ext cx="10058400" cy="4318000"/>
           </a:xfrm>
           <a:prstGeom prst="rect">
             <a:avLst/>
@@ -3694,14 +3285,14 @@
       </p:pic>
       <p:sp>
         <p:nvSpPr>
-          <p:cNvPr id="135" name="TextBox 134"/>
+          <p:cNvPr id="10" name="TextBox 9"/>
           <p:cNvSpPr txBox="1"/>
           <p:nvPr/>
         </p:nvSpPr>
         <p:spPr>
           <a:xfrm>
-            <a:off x="32818291" y="7387028"/>
-            <a:ext cx="10018792" cy="2471456"/>
+            <a:off x="1981200" y="7387028"/>
+            <a:ext cx="7162800" cy="1946444"/>
           </a:xfrm>
           <a:prstGeom prst="rect">
             <a:avLst/>
@@ -3725,31 +3316,62 @@
               </a:lnSpc>
             </a:pPr>
             <a:r>
-              <a:rPr lang="en-US" sz="5400" dirty="0" smtClean="0"/>
-              <a:t>The menu bar provides options for loading GRNs, formatting them, and exporting to SIF/</a:t>
-            </a:r>
-            <a:r>
-              <a:rPr lang="en-US" sz="5400" dirty="0" err="1" smtClean="0"/>
-              <a:t>GraphML</a:t>
-            </a:r>
-            <a:r>
-              <a:rPr lang="en-US" sz="5400" dirty="0" smtClean="0"/>
-              <a:t>.</a:t>
-            </a:r>
-            <a:endParaRPr lang="en-US" sz="5400" dirty="0"/>
-          </a:p>
-        </p:txBody>
-      </p:sp>
-      <p:sp>
-        <p:nvSpPr>
-          <p:cNvPr id="136" name="TextBox 135"/>
+              <a:rPr lang="en-US" sz="8800" b="1" dirty="0" smtClean="0"/>
+              <a:t>About</a:t>
+            </a:r>
+            <a:endParaRPr lang="en-US" sz="8000" b="1" dirty="0"/>
+          </a:p>
+        </p:txBody>
+      </p:sp>
+      <p:cxnSp>
+        <p:nvCxnSpPr>
+          <p:cNvPr id="17" name="Straight Arrow Connector 16"/>
+          <p:cNvCxnSpPr>
+            <a:stCxn id="10" idx="2"/>
+            <a:endCxn id="35" idx="0"/>
+          </p:cNvCxnSpPr>
+          <p:nvPr/>
+        </p:nvCxnSpPr>
+        <p:spPr>
+          <a:xfrm flipH="1">
+            <a:off x="5557004" y="9333472"/>
+            <a:ext cx="5596" cy="1377556"/>
+          </a:xfrm>
+          <a:prstGeom prst="straightConnector1">
+            <a:avLst/>
+          </a:prstGeom>
+          <a:ln w="190500" cmpd="sng">
+            <a:solidFill>
+              <a:srgbClr val="C71585"/>
+            </a:solidFill>
+            <a:tailEnd type="triangle"/>
+          </a:ln>
+        </p:spPr>
+        <p:style>
+          <a:lnRef idx="2">
+            <a:schemeClr val="accent1"/>
+          </a:lnRef>
+          <a:fillRef idx="0">
+            <a:schemeClr val="accent1"/>
+          </a:fillRef>
+          <a:effectRef idx="1">
+            <a:schemeClr val="accent1"/>
+          </a:effectRef>
+          <a:fontRef idx="minor">
+            <a:schemeClr val="tx1"/>
+          </a:fontRef>
+        </p:style>
+      </p:cxnSp>
+      <p:sp>
+        <p:nvSpPr>
+          <p:cNvPr id="35" name="TextBox 34"/>
           <p:cNvSpPr txBox="1"/>
           <p:nvPr/>
         </p:nvSpPr>
         <p:spPr>
           <a:xfrm>
-            <a:off x="32818291" y="15416496"/>
-            <a:ext cx="10018792" cy="3081056"/>
+            <a:off x="547608" y="10711028"/>
+            <a:ext cx="10018792" cy="3028596"/>
           </a:xfrm>
           <a:prstGeom prst="rect">
             <a:avLst/>
@@ -3773,23 +3395,27 @@
               </a:lnSpc>
             </a:pPr>
             <a:r>
+              <a:rPr lang="en-US" sz="5400" dirty="0" err="1" smtClean="0"/>
+              <a:t>GRNsight</a:t>
+            </a:r>
+            <a:r>
               <a:rPr lang="en-US" sz="5400" dirty="0" smtClean="0"/>
-              <a:t>It displays the current graph name when a graph is loaded, as well as the number of nodes and edges in the graph.</a:t>
-            </a:r>
-            <a:endParaRPr lang="en-US" sz="5400" dirty="0"/>
-          </a:p>
-        </p:txBody>
-      </p:sp>
-      <p:sp>
-        <p:nvSpPr>
-          <p:cNvPr id="139" name="TextBox 138"/>
+              <a:t> is a web application and service for visualizing models of small- to medium-scale gene regulatory networks (GRNs). </a:t>
+            </a:r>
+            <a:endParaRPr lang="en-US" sz="6600" dirty="0"/>
+          </a:p>
+        </p:txBody>
+      </p:sp>
+      <p:sp>
+        <p:nvSpPr>
+          <p:cNvPr id="49" name="TextBox 48"/>
           <p:cNvSpPr txBox="1"/>
           <p:nvPr/>
         </p:nvSpPr>
         <p:spPr>
           <a:xfrm>
-            <a:off x="11736637" y="24681510"/>
-            <a:ext cx="10018792" cy="4130112"/>
+            <a:off x="547608" y="15109780"/>
+            <a:ext cx="10018792" cy="2687964"/>
           </a:xfrm>
           <a:prstGeom prst="rect">
             <a:avLst/>
@@ -3814,22 +3440,69 @@
             </a:pPr>
             <a:r>
               <a:rPr lang="en-US" sz="5400" dirty="0" smtClean="0"/>
-              <a:t>The side bar contains options for changing how the graph is drawn, with elements such as the force graph parameter sliders, viewport size toggle, and edge weight toggle, among others.</a:t>
-            </a:r>
-            <a:endParaRPr lang="en-US" sz="5400" dirty="0"/>
-          </a:p>
-        </p:txBody>
-      </p:sp>
-      <p:sp>
-        <p:nvSpPr>
-          <p:cNvPr id="148" name="TextBox 147"/>
+              <a:t>It accepts a representation of a GRN in XLSX, SIF, or </a:t>
+            </a:r>
+            <a:r>
+              <a:rPr lang="en-US" sz="5400" dirty="0" err="1" smtClean="0"/>
+              <a:t>GraphML</a:t>
+            </a:r>
+            <a:r>
+              <a:rPr lang="en-US" sz="5400" dirty="0" smtClean="0"/>
+              <a:t> format and outputs them as a directed graph.</a:t>
+            </a:r>
+            <a:endParaRPr lang="en-US" sz="6600" dirty="0"/>
+          </a:p>
+        </p:txBody>
+      </p:sp>
+      <p:cxnSp>
+        <p:nvCxnSpPr>
+          <p:cNvPr id="63" name="Straight Arrow Connector 62"/>
+          <p:cNvCxnSpPr>
+            <a:stCxn id="35" idx="2"/>
+            <a:endCxn id="49" idx="0"/>
+          </p:cNvCxnSpPr>
+          <p:nvPr/>
+        </p:nvCxnSpPr>
+        <p:spPr>
+          <a:xfrm>
+            <a:off x="5557004" y="13739624"/>
+            <a:ext cx="0" cy="1370156"/>
+          </a:xfrm>
+          <a:prstGeom prst="straightConnector1">
+            <a:avLst/>
+          </a:prstGeom>
+          <a:ln w="190500">
+            <a:solidFill>
+              <a:srgbClr val="C71585"/>
+            </a:solidFill>
+            <a:tailEnd type="triangle"/>
+          </a:ln>
+        </p:spPr>
+        <p:style>
+          <a:lnRef idx="2">
+            <a:schemeClr val="accent1"/>
+          </a:lnRef>
+          <a:fillRef idx="0">
+            <a:schemeClr val="accent1"/>
+          </a:fillRef>
+          <a:effectRef idx="1">
+            <a:schemeClr val="accent1"/>
+          </a:effectRef>
+          <a:fontRef idx="minor">
+            <a:schemeClr val="tx1"/>
+          </a:fontRef>
+        </p:style>
+      </p:cxnSp>
+      <p:sp>
+        <p:nvSpPr>
+          <p:cNvPr id="103" name="TextBox 102"/>
           <p:cNvSpPr txBox="1"/>
           <p:nvPr/>
         </p:nvSpPr>
         <p:spPr>
           <a:xfrm>
-            <a:off x="9142075" y="31043908"/>
-            <a:ext cx="6901688" cy="1307592"/>
+            <a:off x="18707100" y="7819678"/>
+            <a:ext cx="7912099" cy="2410813"/>
           </a:xfrm>
           <a:prstGeom prst="rect">
             <a:avLst/>
@@ -3853,23 +3526,23 @@
               </a:lnSpc>
             </a:pPr>
             <a:r>
-              <a:rPr lang="en-US" sz="5400" dirty="0" smtClean="0"/>
-              <a:t>D3.js: Graph engine</a:t>
-            </a:r>
-            <a:endParaRPr lang="en-US" sz="6600" dirty="0"/>
-          </a:p>
-        </p:txBody>
-      </p:sp>
-      <p:sp>
-        <p:nvSpPr>
-          <p:cNvPr id="149" name="TextBox 148"/>
+              <a:rPr lang="en-US" sz="8800" b="1" dirty="0" smtClean="0"/>
+              <a:t>Snapshot of User Interface</a:t>
+            </a:r>
+            <a:endParaRPr lang="en-US" sz="8800" b="1" dirty="0"/>
+          </a:p>
+        </p:txBody>
+      </p:sp>
+      <p:sp>
+        <p:nvSpPr>
+          <p:cNvPr id="109" name="TextBox 108"/>
           <p:cNvSpPr txBox="1"/>
           <p:nvPr/>
         </p:nvSpPr>
         <p:spPr>
           <a:xfrm>
-            <a:off x="17599954" y="31043908"/>
-            <a:ext cx="6901688" cy="1308158"/>
+            <a:off x="553204" y="19186572"/>
+            <a:ext cx="10018792" cy="2518436"/>
           </a:xfrm>
           <a:prstGeom prst="rect">
             <a:avLst/>
@@ -3894,22 +3567,61 @@
             </a:pPr>
             <a:r>
               <a:rPr lang="en-US" sz="5400" dirty="0" smtClean="0"/>
-              <a:t>Mocha &amp; Chai: Testing</a:t>
-            </a:r>
-            <a:endParaRPr lang="en-US" sz="6600" dirty="0"/>
-          </a:p>
-        </p:txBody>
-      </p:sp>
-      <p:sp>
-        <p:nvSpPr>
-          <p:cNvPr id="150" name="TextBox 149"/>
+              <a:t>Transcription factors are displayed as nodes, with edges representing the relationships between them.</a:t>
+            </a:r>
+            <a:endParaRPr lang="en-US" sz="5400" dirty="0"/>
+          </a:p>
+        </p:txBody>
+      </p:sp>
+      <p:cxnSp>
+        <p:nvCxnSpPr>
+          <p:cNvPr id="114" name="Straight Arrow Connector 113"/>
+          <p:cNvCxnSpPr>
+            <a:stCxn id="49" idx="2"/>
+            <a:endCxn id="109" idx="0"/>
+          </p:cNvCxnSpPr>
+          <p:nvPr/>
+        </p:nvCxnSpPr>
+        <p:spPr>
+          <a:xfrm>
+            <a:off x="5557004" y="17797744"/>
+            <a:ext cx="5596" cy="1388828"/>
+          </a:xfrm>
+          <a:prstGeom prst="straightConnector1">
+            <a:avLst/>
+          </a:prstGeom>
+          <a:ln w="190500" cmpd="sng">
+            <a:solidFill>
+              <a:srgbClr val="C71585"/>
+            </a:solidFill>
+            <a:tailEnd type="triangle"/>
+          </a:ln>
+        </p:spPr>
+        <p:style>
+          <a:lnRef idx="2">
+            <a:schemeClr val="accent1"/>
+          </a:lnRef>
+          <a:fillRef idx="0">
+            <a:schemeClr val="accent1"/>
+          </a:fillRef>
+          <a:effectRef idx="1">
+            <a:schemeClr val="accent1"/>
+          </a:effectRef>
+          <a:fontRef idx="minor">
+            <a:schemeClr val="tx1"/>
+          </a:fontRef>
+        </p:style>
+      </p:cxnSp>
+      <p:sp>
+        <p:nvSpPr>
+          <p:cNvPr id="125" name="TextBox 124"/>
           <p:cNvSpPr txBox="1"/>
           <p:nvPr/>
         </p:nvSpPr>
         <p:spPr>
           <a:xfrm>
-            <a:off x="26073101" y="30993108"/>
-            <a:ext cx="7810499" cy="1308158"/>
+            <a:off x="954008" y="30740076"/>
+            <a:ext cx="7162800" cy="1946444"/>
           </a:xfrm>
           <a:prstGeom prst="rect">
             <a:avLst/>
@@ -3933,27 +3645,23 @@
               </a:lnSpc>
             </a:pPr>
             <a:r>
-              <a:rPr lang="en-US" sz="5400" dirty="0" err="1" smtClean="0"/>
-              <a:t>Node.js</a:t>
-            </a:r>
-            <a:r>
-              <a:rPr lang="en-US" sz="5400" dirty="0" smtClean="0"/>
-              <a:t> &amp; Express: Server</a:t>
-            </a:r>
-            <a:endParaRPr lang="en-US" sz="6600" dirty="0"/>
-          </a:p>
-        </p:txBody>
-      </p:sp>
-      <p:sp>
-        <p:nvSpPr>
-          <p:cNvPr id="151" name="TextBox 150"/>
+              <a:rPr lang="en-US" sz="9600" b="1" dirty="0" smtClean="0"/>
+              <a:t>Technologies</a:t>
+            </a:r>
+            <a:endParaRPr lang="en-US" sz="8000" b="1" dirty="0"/>
+          </a:p>
+        </p:txBody>
+      </p:sp>
+      <p:sp>
+        <p:nvSpPr>
+          <p:cNvPr id="127" name="TextBox 126"/>
           <p:cNvSpPr txBox="1"/>
           <p:nvPr/>
         </p:nvSpPr>
         <p:spPr>
           <a:xfrm>
-            <a:off x="35458401" y="30977796"/>
-            <a:ext cx="7162781" cy="1308158"/>
+            <a:off x="34751300" y="19900962"/>
+            <a:ext cx="7162800" cy="1946444"/>
           </a:xfrm>
           <a:prstGeom prst="rect">
             <a:avLst/>
@@ -3977,23 +3685,23 @@
               </a:lnSpc>
             </a:pPr>
             <a:r>
-              <a:rPr lang="en-US" sz="5400" dirty="0" smtClean="0"/>
-              <a:t>Jade &amp; Stylus: Website</a:t>
-            </a:r>
-            <a:endParaRPr lang="en-US" sz="6600" dirty="0"/>
-          </a:p>
-        </p:txBody>
-      </p:sp>
-      <p:sp>
-        <p:nvSpPr>
-          <p:cNvPr id="152" name="TextBox 151"/>
+              <a:rPr lang="en-US" sz="6600" b="1" dirty="0" smtClean="0"/>
+              <a:t>Acknowledgements</a:t>
+            </a:r>
+            <a:endParaRPr lang="en-US" sz="6600" b="1" dirty="0"/>
+          </a:p>
+        </p:txBody>
+      </p:sp>
+      <p:sp>
+        <p:nvSpPr>
+          <p:cNvPr id="135" name="TextBox 134"/>
           <p:cNvSpPr txBox="1"/>
           <p:nvPr/>
         </p:nvSpPr>
         <p:spPr>
           <a:xfrm>
-            <a:off x="34418665" y="22822860"/>
-            <a:ext cx="7841808" cy="6658123"/>
+            <a:off x="32818291" y="7387028"/>
+            <a:ext cx="10018792" cy="2471456"/>
           </a:xfrm>
           <a:prstGeom prst="rect">
             <a:avLst/>
@@ -4017,165 +3725,31 @@
               </a:lnSpc>
             </a:pPr>
             <a:r>
-              <a:rPr lang="en-US" sz="5400" u="sng" dirty="0" err="1" smtClean="0"/>
-              <a:t>GRNsight</a:t>
-            </a:r>
-            <a:r>
-              <a:rPr lang="en-US" sz="5400" u="sng" dirty="0" smtClean="0"/>
-              <a:t> Team</a:t>
-            </a:r>
-          </a:p>
-          <a:p>
-            <a:pPr algn="ctr">
-              <a:lnSpc>
-                <a:spcPct val="70000"/>
-              </a:lnSpc>
-            </a:pPr>
-            <a:endParaRPr lang="en-US" sz="5400" dirty="0" smtClean="0"/>
-          </a:p>
-          <a:p>
-            <a:pPr algn="ctr">
-              <a:lnSpc>
-                <a:spcPct val="70000"/>
-              </a:lnSpc>
-            </a:pPr>
-            <a:r>
               <a:rPr lang="en-US" sz="5400" dirty="0" smtClean="0"/>
-              <a:t>Jen Shin</a:t>
-            </a:r>
-          </a:p>
-          <a:p>
-            <a:pPr algn="ctr">
-              <a:lnSpc>
-                <a:spcPct val="70000"/>
-              </a:lnSpc>
-            </a:pPr>
+              <a:t>The menu bar provides options for loading GRNs, formatting them, and exporting to SIF/</a:t>
+            </a:r>
+            <a:r>
+              <a:rPr lang="en-US" sz="5400" dirty="0" err="1" smtClean="0"/>
+              <a:t>GraphML</a:t>
+            </a:r>
             <a:r>
               <a:rPr lang="en-US" sz="5400" dirty="0" smtClean="0"/>
-              <a:t>Eileen </a:t>
-            </a:r>
-            <a:r>
-              <a:rPr lang="en-US" sz="5400" dirty="0" err="1" smtClean="0"/>
-              <a:t>Choe</a:t>
-            </a:r>
-            <a:endParaRPr lang="en-US" sz="5400" dirty="0" smtClean="0"/>
-          </a:p>
-          <a:p>
-            <a:pPr algn="ctr">
-              <a:lnSpc>
-                <a:spcPct val="70000"/>
-              </a:lnSpc>
-            </a:pPr>
-            <a:r>
-              <a:rPr lang="en-US" sz="5400" dirty="0" err="1" smtClean="0"/>
-              <a:t>Anu</a:t>
-            </a:r>
-            <a:r>
-              <a:rPr lang="en-US" sz="5400" dirty="0" smtClean="0"/>
-              <a:t> </a:t>
-            </a:r>
-            <a:r>
-              <a:rPr lang="en-US" sz="5400" dirty="0" err="1" smtClean="0"/>
-              <a:t>Varshneya</a:t>
-            </a:r>
-            <a:endParaRPr lang="en-US" sz="5400" dirty="0" smtClean="0"/>
-          </a:p>
-          <a:p>
-            <a:pPr algn="ctr">
-              <a:lnSpc>
-                <a:spcPct val="70000"/>
-              </a:lnSpc>
-            </a:pPr>
-            <a:r>
-              <a:rPr lang="en-US" sz="5400" dirty="0" smtClean="0"/>
-              <a:t>Eddie </a:t>
-            </a:r>
-            <a:r>
-              <a:rPr lang="en-US" sz="5400" dirty="0" err="1" smtClean="0"/>
-              <a:t>Bachoura</a:t>
-            </a:r>
-            <a:endParaRPr lang="en-US" sz="5400" dirty="0" smtClean="0"/>
-          </a:p>
-          <a:p>
-            <a:pPr algn="ctr">
-              <a:lnSpc>
-                <a:spcPct val="70000"/>
-              </a:lnSpc>
-            </a:pPr>
-            <a:r>
-              <a:rPr lang="en-US" sz="5400" dirty="0" err="1" smtClean="0"/>
-              <a:t>Mihir</a:t>
-            </a:r>
-            <a:r>
-              <a:rPr lang="en-US" sz="5400" dirty="0" smtClean="0"/>
-              <a:t> </a:t>
-            </a:r>
-            <a:r>
-              <a:rPr lang="en-US" sz="5400" dirty="0" err="1" smtClean="0"/>
-              <a:t>Samdarshi</a:t>
-            </a:r>
-            <a:endParaRPr lang="en-US" sz="5400" dirty="0" smtClean="0"/>
-          </a:p>
-          <a:p>
-            <a:pPr algn="ctr">
-              <a:lnSpc>
-                <a:spcPct val="70000"/>
-              </a:lnSpc>
-            </a:pPr>
+              <a:t>.</a:t>
+            </a:r>
             <a:endParaRPr lang="en-US" sz="5400" dirty="0"/>
           </a:p>
-          <a:p>
-            <a:pPr algn="ctr">
-              <a:lnSpc>
-                <a:spcPct val="70000"/>
-              </a:lnSpc>
-            </a:pPr>
-            <a:r>
-              <a:rPr lang="en-US" sz="5400" dirty="0" smtClean="0"/>
-              <a:t>Dr. </a:t>
-            </a:r>
-            <a:r>
-              <a:rPr lang="en-US" sz="5400" dirty="0" err="1" smtClean="0"/>
-              <a:t>Kam</a:t>
-            </a:r>
-            <a:r>
-              <a:rPr lang="en-US" sz="5400" dirty="0" smtClean="0"/>
-              <a:t> D. </a:t>
-            </a:r>
-            <a:r>
-              <a:rPr lang="en-US" sz="5400" dirty="0" err="1" smtClean="0"/>
-              <a:t>Dahlquist</a:t>
-            </a:r>
-            <a:endParaRPr lang="en-US" sz="5400" dirty="0" smtClean="0"/>
-          </a:p>
-          <a:p>
-            <a:pPr algn="ctr">
-              <a:lnSpc>
-                <a:spcPct val="70000"/>
-              </a:lnSpc>
-            </a:pPr>
-            <a:r>
-              <a:rPr lang="en-US" sz="5400" dirty="0" smtClean="0"/>
-              <a:t>Dr. John David N. </a:t>
-            </a:r>
-            <a:r>
-              <a:rPr lang="en-US" sz="5400" dirty="0" err="1" smtClean="0"/>
-              <a:t>Dionisio</a:t>
-            </a:r>
-            <a:endParaRPr lang="en-US" sz="5400" dirty="0" smtClean="0"/>
-          </a:p>
-        </p:txBody>
-      </p:sp>
-      <p:sp>
-        <p:nvSpPr>
-          <p:cNvPr id="159" name="TextBox 158"/>
+        </p:txBody>
+      </p:sp>
+      <p:sp>
+        <p:nvSpPr>
+          <p:cNvPr id="136" name="TextBox 135"/>
           <p:cNvSpPr txBox="1"/>
           <p:nvPr/>
         </p:nvSpPr>
         <p:spPr>
           <a:xfrm>
-            <a:off x="2133600" y="22822860"/>
-            <a:ext cx="7162800" cy="1946444"/>
+            <a:off x="32818291" y="15416496"/>
+            <a:ext cx="10018792" cy="3081056"/>
           </a:xfrm>
           <a:prstGeom prst="rect">
             <a:avLst/>
@@ -4199,23 +3773,23 @@
               </a:lnSpc>
             </a:pPr>
             <a:r>
-              <a:rPr lang="en-US" sz="9600" b="1" dirty="0" smtClean="0"/>
-              <a:t>Motivation</a:t>
-            </a:r>
-            <a:endParaRPr lang="en-US" sz="8000" b="1" dirty="0"/>
-          </a:p>
-        </p:txBody>
-      </p:sp>
-      <p:sp>
-        <p:nvSpPr>
-          <p:cNvPr id="160" name="TextBox 159"/>
+              <a:rPr lang="en-US" sz="5400" dirty="0" smtClean="0"/>
+              <a:t>It displays the current graph name when a graph is loaded, as well as the number of nodes and edges in the graph.</a:t>
+            </a:r>
+            <a:endParaRPr lang="en-US" sz="5400" dirty="0"/>
+          </a:p>
+        </p:txBody>
+      </p:sp>
+      <p:sp>
+        <p:nvSpPr>
+          <p:cNvPr id="139" name="TextBox 138"/>
           <p:cNvSpPr txBox="1"/>
           <p:nvPr/>
         </p:nvSpPr>
         <p:spPr>
           <a:xfrm>
-            <a:off x="553204" y="26195586"/>
-            <a:ext cx="10018792" cy="3285397"/>
+            <a:off x="11736637" y="24681510"/>
+            <a:ext cx="10018792" cy="4130112"/>
           </a:xfrm>
           <a:prstGeom prst="rect">
             <a:avLst/>
@@ -4240,6 +3814,432 @@
             </a:pPr>
             <a:r>
               <a:rPr lang="en-US" sz="5400" dirty="0" smtClean="0"/>
+              <a:t>The side bar contains options for changing how the graph is drawn, with elements such as the force graph parameter sliders, viewport size toggle, and edge weight toggle, among others.</a:t>
+            </a:r>
+            <a:endParaRPr lang="en-US" sz="5400" dirty="0"/>
+          </a:p>
+        </p:txBody>
+      </p:sp>
+      <p:sp>
+        <p:nvSpPr>
+          <p:cNvPr id="148" name="TextBox 147"/>
+          <p:cNvSpPr txBox="1"/>
+          <p:nvPr/>
+        </p:nvSpPr>
+        <p:spPr>
+          <a:xfrm>
+            <a:off x="9142075" y="31043908"/>
+            <a:ext cx="6901688" cy="1307592"/>
+          </a:xfrm>
+          <a:prstGeom prst="rect">
+            <a:avLst/>
+          </a:prstGeom>
+          <a:noFill/>
+          <a:ln>
+            <a:solidFill>
+              <a:srgbClr val="000000"/>
+            </a:solidFill>
+          </a:ln>
+        </p:spPr>
+        <p:txBody>
+          <a:bodyPr wrap="square" rtlCol="0" anchor="ctr">
+            <a:noAutofit/>
+          </a:bodyPr>
+          <a:lstStyle/>
+          <a:p>
+            <a:pPr algn="ctr">
+              <a:lnSpc>
+                <a:spcPct val="70000"/>
+              </a:lnSpc>
+            </a:pPr>
+            <a:r>
+              <a:rPr lang="en-US" sz="5400" dirty="0" smtClean="0"/>
+              <a:t>D3.js: Graph engine</a:t>
+            </a:r>
+            <a:endParaRPr lang="en-US" sz="6600" dirty="0"/>
+          </a:p>
+        </p:txBody>
+      </p:sp>
+      <p:sp>
+        <p:nvSpPr>
+          <p:cNvPr id="149" name="TextBox 148"/>
+          <p:cNvSpPr txBox="1"/>
+          <p:nvPr/>
+        </p:nvSpPr>
+        <p:spPr>
+          <a:xfrm>
+            <a:off x="17599954" y="31043908"/>
+            <a:ext cx="6901688" cy="1308158"/>
+          </a:xfrm>
+          <a:prstGeom prst="rect">
+            <a:avLst/>
+          </a:prstGeom>
+          <a:noFill/>
+          <a:ln>
+            <a:solidFill>
+              <a:srgbClr val="000000"/>
+            </a:solidFill>
+          </a:ln>
+        </p:spPr>
+        <p:txBody>
+          <a:bodyPr wrap="square" rtlCol="0" anchor="ctr">
+            <a:noAutofit/>
+          </a:bodyPr>
+          <a:lstStyle/>
+          <a:p>
+            <a:pPr algn="ctr">
+              <a:lnSpc>
+                <a:spcPct val="70000"/>
+              </a:lnSpc>
+            </a:pPr>
+            <a:r>
+              <a:rPr lang="en-US" sz="5400" dirty="0" smtClean="0"/>
+              <a:t>Mocha &amp; Chai: Testing</a:t>
+            </a:r>
+            <a:endParaRPr lang="en-US" sz="6600" dirty="0"/>
+          </a:p>
+        </p:txBody>
+      </p:sp>
+      <p:sp>
+        <p:nvSpPr>
+          <p:cNvPr id="150" name="TextBox 149"/>
+          <p:cNvSpPr txBox="1"/>
+          <p:nvPr/>
+        </p:nvSpPr>
+        <p:spPr>
+          <a:xfrm>
+            <a:off x="26073101" y="30993108"/>
+            <a:ext cx="7810499" cy="1308158"/>
+          </a:xfrm>
+          <a:prstGeom prst="rect">
+            <a:avLst/>
+          </a:prstGeom>
+          <a:noFill/>
+          <a:ln>
+            <a:solidFill>
+              <a:srgbClr val="000000"/>
+            </a:solidFill>
+          </a:ln>
+        </p:spPr>
+        <p:txBody>
+          <a:bodyPr wrap="square" rtlCol="0" anchor="ctr">
+            <a:noAutofit/>
+          </a:bodyPr>
+          <a:lstStyle/>
+          <a:p>
+            <a:pPr algn="ctr">
+              <a:lnSpc>
+                <a:spcPct val="70000"/>
+              </a:lnSpc>
+            </a:pPr>
+            <a:r>
+              <a:rPr lang="en-US" sz="5400" dirty="0" err="1" smtClean="0"/>
+              <a:t>Node.js</a:t>
+            </a:r>
+            <a:r>
+              <a:rPr lang="en-US" sz="5400" dirty="0" smtClean="0"/>
+              <a:t> &amp; Express: Server</a:t>
+            </a:r>
+            <a:endParaRPr lang="en-US" sz="6600" dirty="0"/>
+          </a:p>
+        </p:txBody>
+      </p:sp>
+      <p:sp>
+        <p:nvSpPr>
+          <p:cNvPr id="151" name="TextBox 150"/>
+          <p:cNvSpPr txBox="1"/>
+          <p:nvPr/>
+        </p:nvSpPr>
+        <p:spPr>
+          <a:xfrm>
+            <a:off x="35458401" y="30977796"/>
+            <a:ext cx="7162781" cy="1308158"/>
+          </a:xfrm>
+          <a:prstGeom prst="rect">
+            <a:avLst/>
+          </a:prstGeom>
+          <a:noFill/>
+          <a:ln>
+            <a:solidFill>
+              <a:srgbClr val="000000"/>
+            </a:solidFill>
+          </a:ln>
+        </p:spPr>
+        <p:txBody>
+          <a:bodyPr wrap="square" rtlCol="0" anchor="ctr">
+            <a:noAutofit/>
+          </a:bodyPr>
+          <a:lstStyle/>
+          <a:p>
+            <a:pPr algn="ctr">
+              <a:lnSpc>
+                <a:spcPct val="70000"/>
+              </a:lnSpc>
+            </a:pPr>
+            <a:r>
+              <a:rPr lang="en-US" sz="5400" dirty="0" smtClean="0"/>
+              <a:t>Jade &amp; Stylus: Website</a:t>
+            </a:r>
+            <a:endParaRPr lang="en-US" sz="6600" dirty="0"/>
+          </a:p>
+        </p:txBody>
+      </p:sp>
+      <p:sp>
+        <p:nvSpPr>
+          <p:cNvPr id="152" name="TextBox 151"/>
+          <p:cNvSpPr txBox="1"/>
+          <p:nvPr/>
+        </p:nvSpPr>
+        <p:spPr>
+          <a:xfrm>
+            <a:off x="34418665" y="22822860"/>
+            <a:ext cx="7841808" cy="6658123"/>
+          </a:xfrm>
+          <a:prstGeom prst="rect">
+            <a:avLst/>
+          </a:prstGeom>
+          <a:noFill/>
+          <a:ln>
+            <a:solidFill>
+              <a:srgbClr val="000000"/>
+            </a:solidFill>
+          </a:ln>
+        </p:spPr>
+        <p:txBody>
+          <a:bodyPr wrap="square" rtlCol="0" anchor="ctr">
+            <a:noAutofit/>
+          </a:bodyPr>
+          <a:lstStyle/>
+          <a:p>
+            <a:pPr algn="ctr">
+              <a:lnSpc>
+                <a:spcPct val="70000"/>
+              </a:lnSpc>
+            </a:pPr>
+            <a:r>
+              <a:rPr lang="en-US" sz="5400" u="sng" dirty="0" err="1" smtClean="0"/>
+              <a:t>GRNsight</a:t>
+            </a:r>
+            <a:r>
+              <a:rPr lang="en-US" sz="5400" u="sng" dirty="0" smtClean="0"/>
+              <a:t> Team</a:t>
+            </a:r>
+          </a:p>
+          <a:p>
+            <a:pPr algn="ctr">
+              <a:lnSpc>
+                <a:spcPct val="70000"/>
+              </a:lnSpc>
+            </a:pPr>
+            <a:endParaRPr lang="en-US" sz="5400" dirty="0" smtClean="0"/>
+          </a:p>
+          <a:p>
+            <a:pPr algn="ctr">
+              <a:lnSpc>
+                <a:spcPct val="70000"/>
+              </a:lnSpc>
+            </a:pPr>
+            <a:r>
+              <a:rPr lang="en-US" sz="5400" dirty="0" smtClean="0"/>
+              <a:t>Jen Shin</a:t>
+            </a:r>
+          </a:p>
+          <a:p>
+            <a:pPr algn="ctr">
+              <a:lnSpc>
+                <a:spcPct val="70000"/>
+              </a:lnSpc>
+            </a:pPr>
+            <a:r>
+              <a:rPr lang="en-US" sz="5400" dirty="0" smtClean="0"/>
+              <a:t>Eileen </a:t>
+            </a:r>
+            <a:r>
+              <a:rPr lang="en-US" sz="5400" dirty="0" err="1" smtClean="0"/>
+              <a:t>Choe</a:t>
+            </a:r>
+            <a:endParaRPr lang="en-US" sz="5400" dirty="0" smtClean="0"/>
+          </a:p>
+          <a:p>
+            <a:pPr algn="ctr">
+              <a:lnSpc>
+                <a:spcPct val="70000"/>
+              </a:lnSpc>
+            </a:pPr>
+            <a:r>
+              <a:rPr lang="en-US" sz="5400" dirty="0" err="1" smtClean="0"/>
+              <a:t>Anu</a:t>
+            </a:r>
+            <a:r>
+              <a:rPr lang="en-US" sz="5400" dirty="0" smtClean="0"/>
+              <a:t> </a:t>
+            </a:r>
+            <a:r>
+              <a:rPr lang="en-US" sz="5400" dirty="0" err="1" smtClean="0"/>
+              <a:t>Varshneya</a:t>
+            </a:r>
+            <a:endParaRPr lang="en-US" sz="5400" dirty="0" smtClean="0"/>
+          </a:p>
+          <a:p>
+            <a:pPr algn="ctr">
+              <a:lnSpc>
+                <a:spcPct val="70000"/>
+              </a:lnSpc>
+            </a:pPr>
+            <a:r>
+              <a:rPr lang="en-US" sz="5400" dirty="0" smtClean="0"/>
+              <a:t>Eddie </a:t>
+            </a:r>
+            <a:r>
+              <a:rPr lang="en-US" sz="5400" dirty="0" err="1" smtClean="0"/>
+              <a:t>Bachoura</a:t>
+            </a:r>
+            <a:endParaRPr lang="en-US" sz="5400" dirty="0" smtClean="0"/>
+          </a:p>
+          <a:p>
+            <a:pPr algn="ctr">
+              <a:lnSpc>
+                <a:spcPct val="70000"/>
+              </a:lnSpc>
+            </a:pPr>
+            <a:r>
+              <a:rPr lang="en-US" sz="5400" dirty="0" err="1" smtClean="0"/>
+              <a:t>Mihir</a:t>
+            </a:r>
+            <a:r>
+              <a:rPr lang="en-US" sz="5400" dirty="0" smtClean="0"/>
+              <a:t> </a:t>
+            </a:r>
+            <a:r>
+              <a:rPr lang="en-US" sz="5400" dirty="0" err="1" smtClean="0"/>
+              <a:t>Samdarshi</a:t>
+            </a:r>
+            <a:endParaRPr lang="en-US" sz="5400" dirty="0" smtClean="0"/>
+          </a:p>
+          <a:p>
+            <a:pPr algn="ctr">
+              <a:lnSpc>
+                <a:spcPct val="70000"/>
+              </a:lnSpc>
+            </a:pPr>
+            <a:endParaRPr lang="en-US" sz="5400" dirty="0"/>
+          </a:p>
+          <a:p>
+            <a:pPr algn="ctr">
+              <a:lnSpc>
+                <a:spcPct val="70000"/>
+              </a:lnSpc>
+            </a:pPr>
+            <a:r>
+              <a:rPr lang="en-US" sz="5400" dirty="0" smtClean="0"/>
+              <a:t>Dr. </a:t>
+            </a:r>
+            <a:r>
+              <a:rPr lang="en-US" sz="5400" dirty="0" err="1" smtClean="0"/>
+              <a:t>Kam</a:t>
+            </a:r>
+            <a:r>
+              <a:rPr lang="en-US" sz="5400" dirty="0" smtClean="0"/>
+              <a:t> D. </a:t>
+            </a:r>
+            <a:r>
+              <a:rPr lang="en-US" sz="5400" dirty="0" err="1" smtClean="0"/>
+              <a:t>Dahlquist</a:t>
+            </a:r>
+            <a:endParaRPr lang="en-US" sz="5400" dirty="0" smtClean="0"/>
+          </a:p>
+          <a:p>
+            <a:pPr algn="ctr">
+              <a:lnSpc>
+                <a:spcPct val="70000"/>
+              </a:lnSpc>
+            </a:pPr>
+            <a:r>
+              <a:rPr lang="en-US" sz="5400" dirty="0" smtClean="0"/>
+              <a:t>Dr. John David N. </a:t>
+            </a:r>
+            <a:r>
+              <a:rPr lang="en-US" sz="5400" dirty="0" err="1" smtClean="0"/>
+              <a:t>Dionisio</a:t>
+            </a:r>
+            <a:endParaRPr lang="en-US" sz="5400" dirty="0" smtClean="0"/>
+          </a:p>
+        </p:txBody>
+      </p:sp>
+      <p:sp>
+        <p:nvSpPr>
+          <p:cNvPr id="159" name="TextBox 158"/>
+          <p:cNvSpPr txBox="1"/>
+          <p:nvPr/>
+        </p:nvSpPr>
+        <p:spPr>
+          <a:xfrm>
+            <a:off x="2133600" y="22822860"/>
+            <a:ext cx="7162800" cy="1946444"/>
+          </a:xfrm>
+          <a:prstGeom prst="rect">
+            <a:avLst/>
+          </a:prstGeom>
+          <a:noFill/>
+          <a:ln>
+            <a:solidFill>
+              <a:srgbClr val="000000"/>
+            </a:solidFill>
+          </a:ln>
+        </p:spPr>
+        <p:txBody>
+          <a:bodyPr wrap="square" rtlCol="0" anchor="ctr">
+            <a:noAutofit/>
+          </a:bodyPr>
+          <a:lstStyle/>
+          <a:p>
+            <a:pPr algn="ctr">
+              <a:lnSpc>
+                <a:spcPct val="70000"/>
+              </a:lnSpc>
+            </a:pPr>
+            <a:r>
+              <a:rPr lang="en-US" sz="9600" b="1" dirty="0" smtClean="0"/>
+              <a:t>Motivation</a:t>
+            </a:r>
+            <a:endParaRPr lang="en-US" sz="8000" b="1" dirty="0"/>
+          </a:p>
+        </p:txBody>
+      </p:sp>
+      <p:sp>
+        <p:nvSpPr>
+          <p:cNvPr id="160" name="TextBox 159"/>
+          <p:cNvSpPr txBox="1"/>
+          <p:nvPr/>
+        </p:nvSpPr>
+        <p:spPr>
+          <a:xfrm>
+            <a:off x="553204" y="26195586"/>
+            <a:ext cx="10018792" cy="3285397"/>
+          </a:xfrm>
+          <a:prstGeom prst="rect">
+            <a:avLst/>
+          </a:prstGeom>
+          <a:noFill/>
+          <a:ln>
+            <a:solidFill>
+              <a:srgbClr val="000000"/>
+            </a:solidFill>
+          </a:ln>
+        </p:spPr>
+        <p:txBody>
+          <a:bodyPr wrap="square" rtlCol="0" anchor="ctr">
+            <a:noAutofit/>
+          </a:bodyPr>
+          <a:lstStyle/>
+          <a:p>
+            <a:pPr algn="ctr">
+              <a:lnSpc>
+                <a:spcPct val="70000"/>
+              </a:lnSpc>
+            </a:pPr>
+            <a:r>
+              <a:rPr lang="en-US" sz="5400" dirty="0" smtClean="0"/>
               <a:t>We wanted to create a web-based, intuitive, open-source application for visualizing GRNs that is simple and easy to use.</a:t>
             </a:r>
             <a:endParaRPr lang="en-US" sz="5400" dirty="0"/>
@@ -4254,8 +4254,8 @@
         </p:nvSpPr>
         <p:spPr>
           <a:xfrm>
-            <a:off x="13106400" y="12242800"/>
-            <a:ext cx="5600701" cy="9757006"/>
+            <a:off x="13106400" y="12076334"/>
+            <a:ext cx="3819682" cy="9771072"/>
           </a:xfrm>
           <a:prstGeom prst="rect">
             <a:avLst/>
@@ -4479,14 +4479,15 @@
         <p:nvCxnSpPr>
           <p:cNvPr id="174" name="Straight Arrow Connector 173"/>
           <p:cNvCxnSpPr>
+            <a:stCxn id="162" idx="2"/>
             <a:endCxn id="139" idx="0"/>
           </p:cNvCxnSpPr>
           <p:nvPr/>
         </p:nvCxnSpPr>
         <p:spPr>
           <a:xfrm>
-            <a:off x="16746033" y="21999806"/>
-            <a:ext cx="0" cy="2681704"/>
+            <a:off x="15016241" y="21847406"/>
+            <a:ext cx="1729792" cy="2834104"/>
           </a:xfrm>
           <a:prstGeom prst="straightConnector1">
             <a:avLst/>
@@ -4522,8 +4523,8 @@
         </p:nvSpPr>
         <p:spPr>
           <a:xfrm>
-            <a:off x="13106400" y="10963368"/>
-            <a:ext cx="18288000" cy="1142649"/>
+            <a:off x="13106400" y="10963369"/>
+            <a:ext cx="18288000" cy="928242"/>
           </a:xfrm>
           <a:prstGeom prst="rect">
             <a:avLst/>
@@ -4568,8 +4569,8 @@
         </p:nvSpPr>
         <p:spPr>
           <a:xfrm>
-            <a:off x="18987332" y="12242800"/>
-            <a:ext cx="12407068" cy="9614608"/>
+            <a:off x="17133905" y="12076334"/>
+            <a:ext cx="14260495" cy="9781074"/>
           </a:xfrm>
           <a:prstGeom prst="rect">
             <a:avLst/>

</xml_diff>